<commit_message>
Update script and slides
</commit_message>
<xml_diff>
--- a/dotnet-Data-dev.pptx
+++ b/dotnet-Data-dev.pptx
@@ -13097,21 +13097,34 @@
             </a:r>
             <a:r>
               <a:rPr lang="da-DK" sz="2200" dirty="0"/>
-              <a:t> and in CI</a:t>
-            </a:r>
+              <a:t> and </a:t>
+            </a:r>
+            <a:r>
+              <a:rPr lang="da-DK" sz="2200" dirty="0" err="1"/>
+              <a:t>during</a:t>
+            </a:r>
+            <a:r>
+              <a:rPr lang="da-DK" sz="2200" dirty="0"/>
+              <a:t> </a:t>
+            </a:r>
+            <a:r>
+              <a:rPr lang="da-DK" sz="2200" dirty="0" err="1"/>
+              <a:t>automated</a:t>
+            </a:r>
+            <a:r>
+              <a:rPr lang="da-DK" sz="2200" dirty="0"/>
+              <a:t> </a:t>
+            </a:r>
+            <a:r>
+              <a:rPr lang="da-DK" sz="2200" dirty="0" err="1"/>
+              <a:t>build</a:t>
+            </a:r>
+            <a:endParaRPr lang="da-DK" sz="2200" dirty="0"/>
           </a:p>
           <a:p>
             <a:r>
               <a:rPr lang="da-DK" sz="2200" dirty="0" err="1"/>
-              <a:t>Optional</a:t>
-            </a:r>
-            <a:r>
-              <a:rPr lang="da-DK" sz="2200" dirty="0"/>
-              <a:t>: </a:t>
-            </a:r>
-            <a:r>
-              <a:rPr lang="da-DK" sz="2200" dirty="0" err="1"/>
-              <a:t>Create</a:t>
+              <a:t>Publish</a:t>
             </a:r>
             <a:r>
               <a:rPr lang="da-DK" sz="2200" dirty="0"/>
@@ -13123,11 +13136,19 @@
             </a:r>
             <a:r>
               <a:rPr lang="da-DK" sz="2200" dirty="0"/>
-              <a:t> </a:t>
+              <a:t> data </a:t>
             </a:r>
             <a:r>
               <a:rPr lang="da-DK" sz="2200" dirty="0" err="1"/>
-              <a:t>own</a:t>
+              <a:t>schema</a:t>
+            </a:r>
+            <a:r>
+              <a:rPr lang="da-DK" sz="2200" dirty="0"/>
+              <a:t> in </a:t>
+            </a:r>
+            <a:r>
+              <a:rPr lang="da-DK" sz="2200" dirty="0" err="1"/>
+              <a:t>your</a:t>
             </a:r>
             <a:r>
               <a:rPr lang="da-DK" sz="2200" dirty="0"/>
@@ -13135,28 +13156,39 @@
             </a:r>
             <a:r>
               <a:rPr lang="da-DK" sz="2200" dirty="0" err="1"/>
-              <a:t>rules</a:t>
+              <a:t>deployment</a:t>
             </a:r>
             <a:r>
               <a:rPr lang="da-DK" sz="2200" dirty="0"/>
-              <a:t> and </a:t>
+              <a:t> pipeline</a:t>
+            </a:r>
+          </a:p>
+          <a:p>
+            <a:r>
+              <a:rPr lang="da-DK" sz="2200" dirty="0"/>
+              <a:t>Take </a:t>
             </a:r>
             <a:r>
               <a:rPr lang="da-DK" sz="2200" dirty="0" err="1"/>
-              <a:t>contribute</a:t>
+              <a:t>advantage</a:t>
+            </a:r>
+            <a:r>
+              <a:rPr lang="da-DK" sz="2200" dirty="0"/>
+              <a:t> of </a:t>
+            </a:r>
+            <a:r>
+              <a:rPr lang="da-DK" sz="2200" dirty="0" err="1"/>
+              <a:t>your</a:t>
             </a:r>
             <a:r>
               <a:rPr lang="da-DK" sz="2200" dirty="0"/>
               <a:t> </a:t>
             </a:r>
             <a:r>
-              <a:rPr lang="da-DK" sz="2200" dirty="0" err="1"/>
-              <a:t>them</a:t>
-            </a:r>
-            <a:r>
-              <a:rPr lang="da-DK" sz="2200" dirty="0"/>
-              <a:t> back to the community</a:t>
-            </a:r>
+              <a:rPr lang="da-DK" sz="2200"/>
+              <a:t>SQL Project!</a:t>
+            </a:r>
+            <a:endParaRPr lang="da-DK" sz="2200" dirty="0"/>
           </a:p>
         </p:txBody>
       </p:sp>

</xml_diff>